<commit_message>
View compilation slide edits
</commit_message>
<xml_diff>
--- a/Whats New in ASP.NET Core 2.0.pptx
+++ b/Whats New in ASP.NET Core 2.0.pptx
@@ -147,6 +147,10 @@
 </p:presentation>
 </file>
 
+<file path=ppt/revisionInfo.xml><?xml version="1.0" encoding="utf-8"?>
+<p1510:revInfo xmlns:a="http://schemas.openxmlformats.org/drawingml/2006/main" xmlns:r="http://schemas.openxmlformats.org/officeDocument/2006/relationships" xmlns:p1510="http://schemas.microsoft.com/office/powerpoint/2015/10/main"/>
+</file>
+
 <file path=ppt/notesMasters/notesMaster1.xml><?xml version="1.0" encoding="utf-8"?>
 <p:notesMaster xmlns:a="http://schemas.openxmlformats.org/drawingml/2006/main" xmlns:r="http://schemas.openxmlformats.org/officeDocument/2006/relationships" xmlns:p="http://schemas.openxmlformats.org/presentationml/2006/main">
   <p:cSld>
@@ -762,17 +766,37 @@
           <a:bodyPr/>
           <a:lstStyle/>
           <a:p>
+            <a:pPr marL="171450" marR="0" lvl="0" indent="-171450" algn="l" defTabSz="914400" rtl="0" eaLnBrk="1" fontAlgn="auto" latinLnBrk="0" hangingPunct="1">
+              <a:lnSpc>
+                <a:spcPct val="100000"/>
+              </a:lnSpc>
+              <a:spcBef>
+                <a:spcPts val="0"/>
+              </a:spcBef>
+              <a:spcAft>
+                <a:spcPts val="0"/>
+              </a:spcAft>
+              <a:buClrTx/>
+              <a:buSzTx/>
+              <a:buFontTx/>
+              <a:buChar char="-"/>
+              <a:tabLst/>
+              <a:defRPr/>
+            </a:pPr>
+            <a:r>
+              <a:rPr lang="en-US" dirty="0"/>
+              <a:t>1.x is the “donut of ASP.NET Core”</a:t>
+            </a:r>
+          </a:p>
+          <a:p>
             <a:pPr marL="171450" indent="-171450">
               <a:buFontTx/>
               <a:buChar char="-"/>
             </a:pPr>
             <a:r>
               <a:rPr lang="en-US" dirty="0"/>
-              <a:t>Release mode publishes</a:t>
-            </a:r>
-          </a:p>
-          <a:p>
-            <a:endParaRPr lang="en-US" dirty="0"/>
+              <a:t>Release mode, FDD publish</a:t>
+            </a:r>
           </a:p>
         </p:txBody>
       </p:sp>
@@ -856,7 +880,10 @@
           <a:bodyPr/>
           <a:lstStyle/>
           <a:p>
-            <a:endParaRPr lang="en-US"/>
+            <a:r>
+              <a:rPr lang="en-US" dirty="0"/>
+              <a:t>On by default</a:t>
+            </a:r>
           </a:p>
         </p:txBody>
       </p:sp>
@@ -11211,7 +11238,11 @@
               <a:buNone/>
             </a:pPr>
             <a:r>
-              <a:rPr lang="en-US" b="1" u="sng" dirty="0"/>
+              <a:rPr lang="en-US" b="1" u="sng" dirty="0">
+                <a:solidFill>
+                  <a:srgbClr val="A0C4E5"/>
+                </a:solidFill>
+              </a:rPr>
               <a:t>1.1</a:t>
             </a:r>
           </a:p>
@@ -11251,6 +11282,9 @@
             </a:pPr>
             <a:r>
               <a:rPr lang="en-US" b="1" u="sng" dirty="0">
+                <a:solidFill>
+                  <a:srgbClr val="A0C4E5"/>
+                </a:solidFill>
                 <a:sym typeface="Wingdings" panose="05000000000000000000" pitchFamily="2" charset="2"/>
               </a:rPr>
               <a:t>2.0</a:t>
@@ -11291,6 +11325,307 @@
   <p:clrMapOvr>
     <a:masterClrMapping/>
   </p:clrMapOvr>
+  <p:timing>
+    <p:tnLst>
+      <p:par>
+        <p:cTn id="1" dur="indefinite" restart="never" nodeType="tmRoot">
+          <p:childTnLst>
+            <p:seq concurrent="1" nextAc="seek">
+              <p:cTn id="2" dur="indefinite" nodeType="mainSeq">
+                <p:childTnLst>
+                  <p:par>
+                    <p:cTn id="3" fill="hold">
+                      <p:stCondLst>
+                        <p:cond delay="indefinite"/>
+                      </p:stCondLst>
+                      <p:childTnLst>
+                        <p:par>
+                          <p:cTn id="4" fill="hold">
+                            <p:stCondLst>
+                              <p:cond delay="0"/>
+                            </p:stCondLst>
+                            <p:childTnLst>
+                              <p:par>
+                                <p:cTn id="5" presetID="1" presetClass="entr" presetSubtype="0" fill="hold" nodeType="clickEffect">
+                                  <p:stCondLst>
+                                    <p:cond delay="0"/>
+                                  </p:stCondLst>
+                                  <p:childTnLst>
+                                    <p:set>
+                                      <p:cBhvr>
+                                        <p:cTn id="6" dur="1" fill="hold">
+                                          <p:stCondLst>
+                                            <p:cond delay="0"/>
+                                          </p:stCondLst>
+                                        </p:cTn>
+                                        <p:tgtEl>
+                                          <p:spTgt spid="5">
+                                            <p:txEl>
+                                              <p:pRg st="0" end="0"/>
+                                            </p:txEl>
+                                          </p:spTgt>
+                                        </p:tgtEl>
+                                        <p:attrNameLst>
+                                          <p:attrName>style.visibility</p:attrName>
+                                        </p:attrNameLst>
+                                      </p:cBhvr>
+                                      <p:to>
+                                        <p:strVal val="visible"/>
+                                      </p:to>
+                                    </p:set>
+                                  </p:childTnLst>
+                                </p:cTn>
+                              </p:par>
+                            </p:childTnLst>
+                          </p:cTn>
+                        </p:par>
+                      </p:childTnLst>
+                    </p:cTn>
+                  </p:par>
+                  <p:par>
+                    <p:cTn id="7" fill="hold">
+                      <p:stCondLst>
+                        <p:cond delay="indefinite"/>
+                      </p:stCondLst>
+                      <p:childTnLst>
+                        <p:par>
+                          <p:cTn id="8" fill="hold">
+                            <p:stCondLst>
+                              <p:cond delay="0"/>
+                            </p:stCondLst>
+                            <p:childTnLst>
+                              <p:par>
+                                <p:cTn id="9" presetID="1" presetClass="entr" presetSubtype="0" fill="hold" nodeType="clickEffect">
+                                  <p:stCondLst>
+                                    <p:cond delay="0"/>
+                                  </p:stCondLst>
+                                  <p:childTnLst>
+                                    <p:set>
+                                      <p:cBhvr>
+                                        <p:cTn id="10" dur="1" fill="hold">
+                                          <p:stCondLst>
+                                            <p:cond delay="0"/>
+                                          </p:stCondLst>
+                                        </p:cTn>
+                                        <p:tgtEl>
+                                          <p:spTgt spid="5">
+                                            <p:txEl>
+                                              <p:pRg st="2" end="2"/>
+                                            </p:txEl>
+                                          </p:spTgt>
+                                        </p:tgtEl>
+                                        <p:attrNameLst>
+                                          <p:attrName>style.visibility</p:attrName>
+                                        </p:attrNameLst>
+                                      </p:cBhvr>
+                                      <p:to>
+                                        <p:strVal val="visible"/>
+                                      </p:to>
+                                    </p:set>
+                                  </p:childTnLst>
+                                </p:cTn>
+                              </p:par>
+                              <p:par>
+                                <p:cTn id="11" presetID="1" presetClass="entr" presetSubtype="0" fill="hold" nodeType="withEffect">
+                                  <p:stCondLst>
+                                    <p:cond delay="0"/>
+                                  </p:stCondLst>
+                                  <p:childTnLst>
+                                    <p:set>
+                                      <p:cBhvr>
+                                        <p:cTn id="12" dur="1" fill="hold">
+                                          <p:stCondLst>
+                                            <p:cond delay="0"/>
+                                          </p:stCondLst>
+                                        </p:cTn>
+                                        <p:tgtEl>
+                                          <p:spTgt spid="5">
+                                            <p:txEl>
+                                              <p:pRg st="3" end="3"/>
+                                            </p:txEl>
+                                          </p:spTgt>
+                                        </p:tgtEl>
+                                        <p:attrNameLst>
+                                          <p:attrName>style.visibility</p:attrName>
+                                        </p:attrNameLst>
+                                      </p:cBhvr>
+                                      <p:to>
+                                        <p:strVal val="visible"/>
+                                      </p:to>
+                                    </p:set>
+                                  </p:childTnLst>
+                                </p:cTn>
+                              </p:par>
+                              <p:par>
+                                <p:cTn id="13" presetID="1" presetClass="entr" presetSubtype="0" fill="hold" nodeType="withEffect">
+                                  <p:stCondLst>
+                                    <p:cond delay="0"/>
+                                  </p:stCondLst>
+                                  <p:childTnLst>
+                                    <p:set>
+                                      <p:cBhvr>
+                                        <p:cTn id="14" dur="1" fill="hold">
+                                          <p:stCondLst>
+                                            <p:cond delay="0"/>
+                                          </p:stCondLst>
+                                        </p:cTn>
+                                        <p:tgtEl>
+                                          <p:spTgt spid="5">
+                                            <p:txEl>
+                                              <p:pRg st="4" end="4"/>
+                                            </p:txEl>
+                                          </p:spTgt>
+                                        </p:tgtEl>
+                                        <p:attrNameLst>
+                                          <p:attrName>style.visibility</p:attrName>
+                                        </p:attrNameLst>
+                                      </p:cBhvr>
+                                      <p:to>
+                                        <p:strVal val="visible"/>
+                                      </p:to>
+                                    </p:set>
+                                  </p:childTnLst>
+                                </p:cTn>
+                              </p:par>
+                            </p:childTnLst>
+                          </p:cTn>
+                        </p:par>
+                      </p:childTnLst>
+                    </p:cTn>
+                  </p:par>
+                  <p:par>
+                    <p:cTn id="15" fill="hold">
+                      <p:stCondLst>
+                        <p:cond delay="indefinite"/>
+                      </p:stCondLst>
+                      <p:childTnLst>
+                        <p:par>
+                          <p:cTn id="16" fill="hold">
+                            <p:stCondLst>
+                              <p:cond delay="0"/>
+                            </p:stCondLst>
+                            <p:childTnLst>
+                              <p:par>
+                                <p:cTn id="17" presetID="1" presetClass="entr" presetSubtype="0" fill="hold" nodeType="clickEffect">
+                                  <p:stCondLst>
+                                    <p:cond delay="0"/>
+                                  </p:stCondLst>
+                                  <p:childTnLst>
+                                    <p:set>
+                                      <p:cBhvr>
+                                        <p:cTn id="18" dur="1" fill="hold">
+                                          <p:stCondLst>
+                                            <p:cond delay="0"/>
+                                          </p:stCondLst>
+                                        </p:cTn>
+                                        <p:tgtEl>
+                                          <p:spTgt spid="5">
+                                            <p:txEl>
+                                              <p:pRg st="6" end="6"/>
+                                            </p:txEl>
+                                          </p:spTgt>
+                                        </p:tgtEl>
+                                        <p:attrNameLst>
+                                          <p:attrName>style.visibility</p:attrName>
+                                        </p:attrNameLst>
+                                      </p:cBhvr>
+                                      <p:to>
+                                        <p:strVal val="visible"/>
+                                      </p:to>
+                                    </p:set>
+                                  </p:childTnLst>
+                                </p:cTn>
+                              </p:par>
+                              <p:par>
+                                <p:cTn id="19" presetID="1" presetClass="entr" presetSubtype="0" fill="hold" nodeType="withEffect">
+                                  <p:stCondLst>
+                                    <p:cond delay="0"/>
+                                  </p:stCondLst>
+                                  <p:childTnLst>
+                                    <p:set>
+                                      <p:cBhvr>
+                                        <p:cTn id="20" dur="1" fill="hold">
+                                          <p:stCondLst>
+                                            <p:cond delay="0"/>
+                                          </p:stCondLst>
+                                        </p:cTn>
+                                        <p:tgtEl>
+                                          <p:spTgt spid="5">
+                                            <p:txEl>
+                                              <p:pRg st="7" end="7"/>
+                                            </p:txEl>
+                                          </p:spTgt>
+                                        </p:tgtEl>
+                                        <p:attrNameLst>
+                                          <p:attrName>style.visibility</p:attrName>
+                                        </p:attrNameLst>
+                                      </p:cBhvr>
+                                      <p:to>
+                                        <p:strVal val="visible"/>
+                                      </p:to>
+                                    </p:set>
+                                  </p:childTnLst>
+                                </p:cTn>
+                              </p:par>
+                              <p:par>
+                                <p:cTn id="21" presetID="1" presetClass="entr" presetSubtype="0" fill="hold" nodeType="withEffect">
+                                  <p:stCondLst>
+                                    <p:cond delay="0"/>
+                                  </p:stCondLst>
+                                  <p:childTnLst>
+                                    <p:set>
+                                      <p:cBhvr>
+                                        <p:cTn id="22" dur="1" fill="hold">
+                                          <p:stCondLst>
+                                            <p:cond delay="0"/>
+                                          </p:stCondLst>
+                                        </p:cTn>
+                                        <p:tgtEl>
+                                          <p:spTgt spid="5">
+                                            <p:txEl>
+                                              <p:pRg st="8" end="8"/>
+                                            </p:txEl>
+                                          </p:spTgt>
+                                        </p:tgtEl>
+                                        <p:attrNameLst>
+                                          <p:attrName>style.visibility</p:attrName>
+                                        </p:attrNameLst>
+                                      </p:cBhvr>
+                                      <p:to>
+                                        <p:strVal val="visible"/>
+                                      </p:to>
+                                    </p:set>
+                                  </p:childTnLst>
+                                </p:cTn>
+                              </p:par>
+                            </p:childTnLst>
+                          </p:cTn>
+                        </p:par>
+                      </p:childTnLst>
+                    </p:cTn>
+                  </p:par>
+                </p:childTnLst>
+              </p:cTn>
+              <p:prevCondLst>
+                <p:cond evt="onPrev" delay="0">
+                  <p:tgtEl>
+                    <p:sldTgt/>
+                  </p:tgtEl>
+                </p:cond>
+              </p:prevCondLst>
+              <p:nextCondLst>
+                <p:cond evt="onNext" delay="0">
+                  <p:tgtEl>
+                    <p:sldTgt/>
+                  </p:tgtEl>
+                </p:cond>
+              </p:nextCondLst>
+            </p:seq>
+          </p:childTnLst>
+        </p:cTn>
+      </p:par>
+    </p:tnLst>
+  </p:timing>
 </p:sld>
 </file>
 
@@ -11360,43 +11695,1004 @@
             <a:spLocks noGrp="1"/>
           </p:cNvSpPr>
           <p:nvPr>
-            <p:ph sz="half" idx="1"/>
+            <p:ph idx="1"/>
           </p:nvPr>
         </p:nvSpPr>
         <p:spPr/>
         <p:txBody>
-          <a:bodyPr/>
+          <a:bodyPr>
+            <a:normAutofit/>
+          </a:bodyPr>
           <a:lstStyle/>
           <a:p>
-            <a:endParaRPr lang="en-US" dirty="0"/>
+            <a:pPr marL="0" indent="0">
+              <a:buNone/>
+            </a:pPr>
+            <a:endParaRPr lang="en-US" sz="2000" dirty="0">
+              <a:solidFill>
+                <a:srgbClr val="569CD6"/>
+              </a:solidFill>
+              <a:latin typeface="Consolas" panose="020B0609020204030204" pitchFamily="49" charset="0"/>
+            </a:endParaRPr>
+          </a:p>
+          <a:p>
+            <a:pPr marL="0" indent="0">
+              <a:buNone/>
+            </a:pPr>
+            <a:endParaRPr lang="en-US" sz="2000" dirty="0">
+              <a:solidFill>
+                <a:srgbClr val="569CD6"/>
+              </a:solidFill>
+              <a:latin typeface="Consolas" panose="020B0609020204030204" pitchFamily="49" charset="0"/>
+            </a:endParaRPr>
+          </a:p>
+          <a:p>
+            <a:pPr marL="0" indent="0">
+              <a:buNone/>
+            </a:pPr>
+            <a:endParaRPr lang="en-US" sz="2000" dirty="0">
+              <a:solidFill>
+                <a:srgbClr val="569CD6"/>
+              </a:solidFill>
+              <a:latin typeface="Consolas" panose="020B0609020204030204" pitchFamily="49" charset="0"/>
+            </a:endParaRPr>
+          </a:p>
+          <a:p>
+            <a:pPr marL="0" indent="0">
+              <a:buNone/>
+            </a:pPr>
+            <a:endParaRPr lang="en-US" sz="2000" dirty="0"/>
+          </a:p>
+          <a:p>
+            <a:pPr marL="0" indent="0">
+              <a:buNone/>
+            </a:pPr>
+            <a:endParaRPr lang="en-US" sz="2000" dirty="0"/>
           </a:p>
         </p:txBody>
       </p:sp>
-      <p:sp>
-        <p:nvSpPr>
-          <p:cNvPr id="5" name="Content Placeholder 4">
+      <p:graphicFrame>
+        <p:nvGraphicFramePr>
+          <p:cNvPr id="7" name="Table 6">
             <a:extLst>
               <a:ext uri="{FF2B5EF4-FFF2-40B4-BE49-F238E27FC236}">
-                <a16:creationId xmlns:a16="http://schemas.microsoft.com/office/drawing/2014/main" id="{B9012F0A-1710-4125-BBBE-3F11CE106E8A}"/>
+                <a16:creationId xmlns:a16="http://schemas.microsoft.com/office/drawing/2014/main" id="{D4EC7F52-7DC9-448B-85DB-5E1C4DDC9EC6}"/>
               </a:ext>
             </a:extLst>
           </p:cNvPr>
-          <p:cNvSpPr>
-            <a:spLocks noGrp="1"/>
-          </p:cNvSpPr>
-          <p:nvPr>
-            <p:ph sz="half" idx="2"/>
-          </p:nvPr>
-        </p:nvSpPr>
-        <p:spPr/>
+          <p:cNvGraphicFramePr>
+            <a:graphicFrameLocks noGrp="1"/>
+          </p:cNvGraphicFramePr>
+          <p:nvPr>
+            <p:extLst>
+              <p:ext uri="{D42A27DB-BD31-4B8C-83A1-F6EECF244321}">
+                <p14:modId xmlns:p14="http://schemas.microsoft.com/office/powerpoint/2010/main" val="1222825255"/>
+              </p:ext>
+            </p:extLst>
+          </p:nvPr>
+        </p:nvGraphicFramePr>
+        <p:xfrm>
+          <a:off x="937490" y="2211476"/>
+          <a:ext cx="10416310" cy="1615440"/>
+        </p:xfrm>
+        <a:graphic>
+          <a:graphicData uri="http://schemas.openxmlformats.org/drawingml/2006/table">
+            <a:tbl>
+              <a:tblPr firstRow="1" bandRow="1">
+                <a:tableStyleId>{5C22544A-7EE6-4342-B048-85BDC9FD1C3A}</a:tableStyleId>
+              </a:tblPr>
+              <a:tblGrid>
+                <a:gridCol w="10416310">
+                  <a:extLst>
+                    <a:ext uri="{9D8B030D-6E8A-4147-A177-3AD203B41FA5}">
+                      <a16:colId xmlns:a16="http://schemas.microsoft.com/office/drawing/2014/main" val="1057070397"/>
+                    </a:ext>
+                  </a:extLst>
+                </a:gridCol>
+              </a:tblGrid>
+              <a:tr h="584446">
+                <a:tc>
+                  <a:txBody>
+                    <a:bodyPr/>
+                    <a:lstStyle/>
+                    <a:p>
+                      <a:pPr marL="0" indent="0">
+                        <a:buNone/>
+                      </a:pPr>
+                      <a:r>
+                        <a:rPr lang="en-US" sz="2000" dirty="0">
+                          <a:solidFill>
+                            <a:srgbClr val="569CD6"/>
+                          </a:solidFill>
+                          <a:latin typeface="Consolas" panose="020B0609020204030204" pitchFamily="49" charset="0"/>
+                        </a:rPr>
+                        <a:t>&lt;Project </a:t>
+                      </a:r>
+                      <a:r>
+                        <a:rPr lang="en-US" sz="2000" dirty="0" err="1">
+                          <a:solidFill>
+                            <a:srgbClr val="9CDCFE"/>
+                          </a:solidFill>
+                          <a:latin typeface="Consolas" panose="020B0609020204030204" pitchFamily="49" charset="0"/>
+                        </a:rPr>
+                        <a:t>Sdk</a:t>
+                      </a:r>
+                      <a:r>
+                        <a:rPr lang="en-US" sz="2000" dirty="0">
+                          <a:solidFill>
+                            <a:srgbClr val="569CD6"/>
+                          </a:solidFill>
+                          <a:latin typeface="Consolas" panose="020B0609020204030204" pitchFamily="49" charset="0"/>
+                        </a:rPr>
+                        <a:t>=</a:t>
+                      </a:r>
+                      <a:r>
+                        <a:rPr lang="en-US" sz="2000" dirty="0">
+                          <a:solidFill>
+                            <a:srgbClr val="CE9178"/>
+                          </a:solidFill>
+                          <a:latin typeface="Consolas" panose="020B0609020204030204" pitchFamily="49" charset="0"/>
+                        </a:rPr>
+                        <a:t>"</a:t>
+                      </a:r>
+                      <a:r>
+                        <a:rPr lang="en-US" sz="2000" dirty="0" err="1">
+                          <a:solidFill>
+                            <a:srgbClr val="CE9178"/>
+                          </a:solidFill>
+                          <a:latin typeface="Consolas" panose="020B0609020204030204" pitchFamily="49" charset="0"/>
+                        </a:rPr>
+                        <a:t>Microsoft.NET.Sdk.Web</a:t>
+                      </a:r>
+                      <a:r>
+                        <a:rPr lang="en-US" sz="2000" dirty="0">
+                          <a:solidFill>
+                            <a:srgbClr val="CE9178"/>
+                          </a:solidFill>
+                          <a:latin typeface="Consolas" panose="020B0609020204030204" pitchFamily="49" charset="0"/>
+                        </a:rPr>
+                        <a:t>"</a:t>
+                      </a:r>
+                      <a:r>
+                        <a:rPr lang="en-US" sz="2000" dirty="0">
+                          <a:solidFill>
+                            <a:srgbClr val="569CD6"/>
+                          </a:solidFill>
+                          <a:latin typeface="Consolas" panose="020B0609020204030204" pitchFamily="49" charset="0"/>
+                        </a:rPr>
+                        <a:t>&gt;</a:t>
+                      </a:r>
+                      <a:endParaRPr lang="en-US" sz="2000" dirty="0">
+                        <a:solidFill>
+                          <a:srgbClr val="FAFCFE"/>
+                        </a:solidFill>
+                        <a:latin typeface="Consolas" panose="020B0609020204030204" pitchFamily="49" charset="0"/>
+                      </a:endParaRPr>
+                    </a:p>
+                    <a:p>
+                      <a:pPr marL="0" indent="0">
+                        <a:buNone/>
+                      </a:pPr>
+                      <a:r>
+                        <a:rPr lang="en-US" sz="2000" dirty="0">
+                          <a:solidFill>
+                            <a:srgbClr val="FAFCFE"/>
+                          </a:solidFill>
+                          <a:latin typeface="Consolas" panose="020B0609020204030204" pitchFamily="49" charset="0"/>
+                        </a:rPr>
+                        <a:t>	</a:t>
+                      </a:r>
+                      <a:r>
+                        <a:rPr lang="en-US" sz="2000" dirty="0">
+                          <a:solidFill>
+                            <a:srgbClr val="569CD6"/>
+                          </a:solidFill>
+                          <a:latin typeface="Consolas" panose="020B0609020204030204" pitchFamily="49" charset="0"/>
+                        </a:rPr>
+                        <a:t>&lt;</a:t>
+                      </a:r>
+                      <a:r>
+                        <a:rPr lang="en-US" sz="2000" dirty="0" err="1">
+                          <a:solidFill>
+                            <a:srgbClr val="569CD6"/>
+                          </a:solidFill>
+                          <a:latin typeface="Consolas" panose="020B0609020204030204" pitchFamily="49" charset="0"/>
+                        </a:rPr>
+                        <a:t>PropertyGroup</a:t>
+                      </a:r>
+                      <a:r>
+                        <a:rPr lang="en-US" sz="2000" dirty="0">
+                          <a:solidFill>
+                            <a:srgbClr val="569CD6"/>
+                          </a:solidFill>
+                          <a:latin typeface="Consolas" panose="020B0609020204030204" pitchFamily="49" charset="0"/>
+                        </a:rPr>
+                        <a:t>&gt;</a:t>
+                      </a:r>
+                      <a:endParaRPr lang="en-US" sz="2000" dirty="0">
+                        <a:solidFill>
+                          <a:srgbClr val="FAFCFE"/>
+                        </a:solidFill>
+                        <a:latin typeface="Consolas" panose="020B0609020204030204" pitchFamily="49" charset="0"/>
+                      </a:endParaRPr>
+                    </a:p>
+                    <a:p>
+                      <a:pPr marL="0" indent="0">
+                        <a:buNone/>
+                      </a:pPr>
+                      <a:r>
+                        <a:rPr lang="en-US" sz="2000" dirty="0">
+                          <a:solidFill>
+                            <a:srgbClr val="FAFCFE"/>
+                          </a:solidFill>
+                          <a:latin typeface="Consolas" panose="020B0609020204030204" pitchFamily="49" charset="0"/>
+                        </a:rPr>
+                        <a:t>		</a:t>
+                      </a:r>
+                      <a:r>
+                        <a:rPr lang="en-US" sz="2000" dirty="0">
+                          <a:solidFill>
+                            <a:srgbClr val="569CD6"/>
+                          </a:solidFill>
+                          <a:latin typeface="Consolas" panose="020B0609020204030204" pitchFamily="49" charset="0"/>
+                        </a:rPr>
+                        <a:t>&lt;</a:t>
+                      </a:r>
+                      <a:r>
+                        <a:rPr lang="en-US" sz="2000" dirty="0" err="1">
+                          <a:solidFill>
+                            <a:srgbClr val="569CD6"/>
+                          </a:solidFill>
+                          <a:latin typeface="Consolas" panose="020B0609020204030204" pitchFamily="49" charset="0"/>
+                        </a:rPr>
+                        <a:t>TargetFramework</a:t>
+                      </a:r>
+                      <a:r>
+                        <a:rPr lang="en-US" sz="2000" dirty="0">
+                          <a:solidFill>
+                            <a:srgbClr val="569CD6"/>
+                          </a:solidFill>
+                          <a:latin typeface="Consolas" panose="020B0609020204030204" pitchFamily="49" charset="0"/>
+                        </a:rPr>
+                        <a:t>&gt;</a:t>
+                      </a:r>
+                      <a:r>
+                        <a:rPr lang="en-US" sz="2000" dirty="0">
+                          <a:solidFill>
+                            <a:srgbClr val="CE9178"/>
+                          </a:solidFill>
+                          <a:latin typeface="Consolas" panose="020B0609020204030204" pitchFamily="49" charset="0"/>
+                        </a:rPr>
+                        <a:t>netcoreapp2.0</a:t>
+                      </a:r>
+                      <a:r>
+                        <a:rPr lang="en-US" sz="2000" dirty="0">
+                          <a:solidFill>
+                            <a:srgbClr val="569CD6"/>
+                          </a:solidFill>
+                          <a:latin typeface="Consolas" panose="020B0609020204030204" pitchFamily="49" charset="0"/>
+                        </a:rPr>
+                        <a:t>&lt;/</a:t>
+                      </a:r>
+                      <a:r>
+                        <a:rPr lang="en-US" sz="2000" dirty="0" err="1">
+                          <a:solidFill>
+                            <a:srgbClr val="569CD6"/>
+                          </a:solidFill>
+                          <a:latin typeface="Consolas" panose="020B0609020204030204" pitchFamily="49" charset="0"/>
+                        </a:rPr>
+                        <a:t>TargetFramework</a:t>
+                      </a:r>
+                      <a:r>
+                        <a:rPr lang="en-US" sz="2000" dirty="0">
+                          <a:solidFill>
+                            <a:srgbClr val="569CD6"/>
+                          </a:solidFill>
+                          <a:latin typeface="Consolas" panose="020B0609020204030204" pitchFamily="49" charset="0"/>
+                        </a:rPr>
+                        <a:t>&gt;</a:t>
+                      </a:r>
+                      <a:r>
+                        <a:rPr lang="en-US" sz="2000" dirty="0">
+                          <a:solidFill>
+                            <a:srgbClr val="FAFCFE"/>
+                          </a:solidFill>
+                          <a:latin typeface="Consolas" panose="020B0609020204030204" pitchFamily="49" charset="0"/>
+                        </a:rPr>
+                        <a:t> 				</a:t>
+                      </a:r>
+                      <a:r>
+                        <a:rPr lang="en-US" sz="2000" dirty="0">
+                          <a:solidFill>
+                            <a:srgbClr val="569CD6"/>
+                          </a:solidFill>
+                          <a:latin typeface="Consolas" panose="020B0609020204030204" pitchFamily="49" charset="0"/>
+                        </a:rPr>
+                        <a:t>&lt;</a:t>
+                      </a:r>
+                      <a:r>
+                        <a:rPr lang="en-US" sz="2000" dirty="0" err="1">
+                          <a:solidFill>
+                            <a:srgbClr val="569CD6"/>
+                          </a:solidFill>
+                          <a:latin typeface="Consolas" panose="020B0609020204030204" pitchFamily="49" charset="0"/>
+                        </a:rPr>
+                        <a:t>MvcRazorCompileOnPublish</a:t>
+                      </a:r>
+                      <a:r>
+                        <a:rPr lang="en-US" sz="2000" dirty="0">
+                          <a:solidFill>
+                            <a:srgbClr val="569CD6"/>
+                          </a:solidFill>
+                          <a:latin typeface="Consolas" panose="020B0609020204030204" pitchFamily="49" charset="0"/>
+                        </a:rPr>
+                        <a:t>&gt;</a:t>
+                      </a:r>
+                      <a:r>
+                        <a:rPr lang="en-US" sz="2000" dirty="0">
+                          <a:solidFill>
+                            <a:srgbClr val="CE9178"/>
+                          </a:solidFill>
+                          <a:latin typeface="Consolas" panose="020B0609020204030204" pitchFamily="49" charset="0"/>
+                        </a:rPr>
+                        <a:t>false</a:t>
+                      </a:r>
+                      <a:r>
+                        <a:rPr lang="en-US" sz="2000" dirty="0">
+                          <a:solidFill>
+                            <a:srgbClr val="569CD6"/>
+                          </a:solidFill>
+                          <a:latin typeface="Consolas" panose="020B0609020204030204" pitchFamily="49" charset="0"/>
+                        </a:rPr>
+                        <a:t>&lt;/</a:t>
+                      </a:r>
+                      <a:r>
+                        <a:rPr lang="en-US" sz="2000" dirty="0" err="1">
+                          <a:solidFill>
+                            <a:srgbClr val="569CD6"/>
+                          </a:solidFill>
+                          <a:latin typeface="Consolas" panose="020B0609020204030204" pitchFamily="49" charset="0"/>
+                        </a:rPr>
+                        <a:t>MvcRazorCompileOnPublish</a:t>
+                      </a:r>
+                      <a:r>
+                        <a:rPr lang="en-US" sz="2000" dirty="0">
+                          <a:solidFill>
+                            <a:srgbClr val="569CD6"/>
+                          </a:solidFill>
+                          <a:latin typeface="Consolas" panose="020B0609020204030204" pitchFamily="49" charset="0"/>
+                        </a:rPr>
+                        <a:t>&gt;</a:t>
+                      </a:r>
+                      <a:r>
+                        <a:rPr lang="en-US" sz="2000" dirty="0">
+                          <a:solidFill>
+                            <a:srgbClr val="FAFCFE"/>
+                          </a:solidFill>
+                          <a:latin typeface="Consolas" panose="020B0609020204030204" pitchFamily="49" charset="0"/>
+                        </a:rPr>
+                        <a:t> 	</a:t>
+                      </a:r>
+                      <a:r>
+                        <a:rPr lang="en-US" sz="2000" dirty="0">
+                          <a:solidFill>
+                            <a:srgbClr val="569CD6"/>
+                          </a:solidFill>
+                          <a:latin typeface="Consolas" panose="020B0609020204030204" pitchFamily="49" charset="0"/>
+                        </a:rPr>
+                        <a:t>&lt;/</a:t>
+                      </a:r>
+                      <a:r>
+                        <a:rPr lang="en-US" sz="2000" dirty="0" err="1">
+                          <a:solidFill>
+                            <a:srgbClr val="569CD6"/>
+                          </a:solidFill>
+                          <a:latin typeface="Consolas" panose="020B0609020204030204" pitchFamily="49" charset="0"/>
+                        </a:rPr>
+                        <a:t>PropertyGroup</a:t>
+                      </a:r>
+                      <a:r>
+                        <a:rPr lang="en-US" sz="2000" dirty="0">
+                          <a:solidFill>
+                            <a:srgbClr val="569CD6"/>
+                          </a:solidFill>
+                          <a:latin typeface="Consolas" panose="020B0609020204030204" pitchFamily="49" charset="0"/>
+                        </a:rPr>
+                        <a:t>&gt;</a:t>
+                      </a:r>
+                      <a:endParaRPr lang="en-US" sz="2000" dirty="0">
+                        <a:solidFill>
+                          <a:srgbClr val="000000"/>
+                        </a:solidFill>
+                        <a:latin typeface="Consolas" panose="020B0609020204030204" pitchFamily="49" charset="0"/>
+                      </a:endParaRPr>
+                    </a:p>
+                  </a:txBody>
+                  <a:tcPr>
+                    <a:lnL w="12700" cap="flat" cmpd="sng" algn="ctr">
+                      <a:solidFill>
+                        <a:schemeClr val="tx1"/>
+                      </a:solidFill>
+                      <a:prstDash val="solid"/>
+                      <a:round/>
+                      <a:headEnd type="none" w="med" len="med"/>
+                      <a:tailEnd type="none" w="med" len="med"/>
+                    </a:lnL>
+                    <a:lnR w="12700" cap="flat" cmpd="sng" algn="ctr">
+                      <a:solidFill>
+                        <a:schemeClr val="tx1"/>
+                      </a:solidFill>
+                      <a:prstDash val="solid"/>
+                      <a:round/>
+                      <a:headEnd type="none" w="med" len="med"/>
+                      <a:tailEnd type="none" w="med" len="med"/>
+                    </a:lnR>
+                    <a:lnT w="12700" cap="flat" cmpd="sng" algn="ctr">
+                      <a:solidFill>
+                        <a:schemeClr val="tx1"/>
+                      </a:solidFill>
+                      <a:prstDash val="solid"/>
+                      <a:round/>
+                      <a:headEnd type="none" w="med" len="med"/>
+                      <a:tailEnd type="none" w="med" len="med"/>
+                    </a:lnT>
+                    <a:lnB w="12700" cap="flat" cmpd="sng" algn="ctr">
+                      <a:solidFill>
+                        <a:schemeClr val="tx1"/>
+                      </a:solidFill>
+                      <a:prstDash val="solid"/>
+                      <a:round/>
+                      <a:headEnd type="none" w="med" len="med"/>
+                      <a:tailEnd type="none" w="med" len="med"/>
+                    </a:lnB>
+                    <a:solidFill>
+                      <a:schemeClr val="tx1"/>
+                    </a:solidFill>
+                  </a:tcPr>
+                </a:tc>
+                <a:extLst>
+                  <a:ext uri="{0D108BD9-81ED-4DB2-BD59-A6C34878D82A}">
+                    <a16:rowId xmlns:a16="http://schemas.microsoft.com/office/drawing/2014/main" val="3473222697"/>
+                  </a:ext>
+                </a:extLst>
+              </a:tr>
+            </a:tbl>
+          </a:graphicData>
+        </a:graphic>
+      </p:graphicFrame>
+      <p:sp>
+        <p:nvSpPr>
+          <p:cNvPr id="8" name="Rectangle 7">
+            <a:extLst>
+              <a:ext uri="{FF2B5EF4-FFF2-40B4-BE49-F238E27FC236}">
+                <a16:creationId xmlns:a16="http://schemas.microsoft.com/office/drawing/2014/main" id="{32EE0222-9DF9-496C-B082-C5D30FC330F3}"/>
+              </a:ext>
+            </a:extLst>
+          </p:cNvPr>
+          <p:cNvSpPr/>
+          <p:nvPr/>
+        </p:nvSpPr>
+        <p:spPr>
+          <a:xfrm>
+            <a:off x="950278" y="1764907"/>
+            <a:ext cx="2900800" cy="446567"/>
+          </a:xfrm>
+          <a:prstGeom prst="rect">
+            <a:avLst/>
+          </a:prstGeom>
+          <a:ln w="57150">
+            <a:solidFill>
+              <a:schemeClr val="accent1">
+                <a:lumMod val="50000"/>
+              </a:schemeClr>
+            </a:solidFill>
+          </a:ln>
+        </p:spPr>
+        <p:style>
+          <a:lnRef idx="1">
+            <a:schemeClr val="accent1"/>
+          </a:lnRef>
+          <a:fillRef idx="2">
+            <a:schemeClr val="accent1"/>
+          </a:fillRef>
+          <a:effectRef idx="1">
+            <a:schemeClr val="accent1"/>
+          </a:effectRef>
+          <a:fontRef idx="minor">
+            <a:schemeClr val="dk1"/>
+          </a:fontRef>
+        </p:style>
         <p:txBody>
-          <a:bodyPr/>
+          <a:bodyPr rtlCol="0" anchor="ctr"/>
           <a:lstStyle/>
           <a:p>
-            <a:endParaRPr lang="en-US"/>
+            <a:pPr algn="ctr"/>
+            <a:r>
+              <a:rPr lang="en-US" b="1" dirty="0"/>
+              <a:t>2xCoreApp.csproj</a:t>
+            </a:r>
           </a:p>
         </p:txBody>
       </p:sp>
+      <p:graphicFrame>
+        <p:nvGraphicFramePr>
+          <p:cNvPr id="9" name="Table 8">
+            <a:extLst>
+              <a:ext uri="{FF2B5EF4-FFF2-40B4-BE49-F238E27FC236}">
+                <a16:creationId xmlns:a16="http://schemas.microsoft.com/office/drawing/2014/main" id="{6681CE37-17F7-4A84-8315-EE9AAE9B4981}"/>
+              </a:ext>
+            </a:extLst>
+          </p:cNvPr>
+          <p:cNvGraphicFramePr>
+            <a:graphicFrameLocks noGrp="1"/>
+          </p:cNvGraphicFramePr>
+          <p:nvPr>
+            <p:extLst>
+              <p:ext uri="{D42A27DB-BD31-4B8C-83A1-F6EECF244321}">
+                <p14:modId xmlns:p14="http://schemas.microsoft.com/office/powerpoint/2010/main" val="905393098"/>
+              </p:ext>
+            </p:extLst>
+          </p:nvPr>
+        </p:nvGraphicFramePr>
+        <p:xfrm>
+          <a:off x="937490" y="4887321"/>
+          <a:ext cx="10416310" cy="1310640"/>
+        </p:xfrm>
+        <a:graphic>
+          <a:graphicData uri="http://schemas.openxmlformats.org/drawingml/2006/table">
+            <a:tbl>
+              <a:tblPr firstRow="1" bandRow="1">
+                <a:tableStyleId>{5C22544A-7EE6-4342-B048-85BDC9FD1C3A}</a:tableStyleId>
+              </a:tblPr>
+              <a:tblGrid>
+                <a:gridCol w="10416310">
+                  <a:extLst>
+                    <a:ext uri="{9D8B030D-6E8A-4147-A177-3AD203B41FA5}">
+                      <a16:colId xmlns:a16="http://schemas.microsoft.com/office/drawing/2014/main" val="1057070397"/>
+                    </a:ext>
+                  </a:extLst>
+                </a:gridCol>
+              </a:tblGrid>
+              <a:tr h="584446">
+                <a:tc>
+                  <a:txBody>
+                    <a:bodyPr/>
+                    <a:lstStyle/>
+                    <a:p>
+                      <a:pPr marL="0" indent="0">
+                        <a:buNone/>
+                      </a:pPr>
+                      <a:r>
+                        <a:rPr lang="en-US" sz="2000" dirty="0">
+                          <a:solidFill>
+                            <a:srgbClr val="569CD6"/>
+                          </a:solidFill>
+                          <a:latin typeface="Consolas" panose="020B0609020204030204" pitchFamily="49" charset="0"/>
+                        </a:rPr>
+                        <a:t>&lt;Project </a:t>
+                      </a:r>
+                      <a:r>
+                        <a:rPr lang="en-US" sz="2000" dirty="0" err="1">
+                          <a:solidFill>
+                            <a:srgbClr val="9CDCFE"/>
+                          </a:solidFill>
+                          <a:latin typeface="Consolas" panose="020B0609020204030204" pitchFamily="49" charset="0"/>
+                        </a:rPr>
+                        <a:t>Sdk</a:t>
+                      </a:r>
+                      <a:r>
+                        <a:rPr lang="en-US" sz="2000" dirty="0">
+                          <a:solidFill>
+                            <a:srgbClr val="569CD6"/>
+                          </a:solidFill>
+                          <a:latin typeface="Consolas" panose="020B0609020204030204" pitchFamily="49" charset="0"/>
+                        </a:rPr>
+                        <a:t>=</a:t>
+                      </a:r>
+                      <a:r>
+                        <a:rPr lang="en-US" sz="2000" dirty="0">
+                          <a:solidFill>
+                            <a:srgbClr val="CE9178"/>
+                          </a:solidFill>
+                          <a:latin typeface="Consolas" panose="020B0609020204030204" pitchFamily="49" charset="0"/>
+                        </a:rPr>
+                        <a:t>"</a:t>
+                      </a:r>
+                      <a:r>
+                        <a:rPr lang="en-US" sz="2000" dirty="0" err="1">
+                          <a:solidFill>
+                            <a:srgbClr val="CE9178"/>
+                          </a:solidFill>
+                          <a:latin typeface="Consolas" panose="020B0609020204030204" pitchFamily="49" charset="0"/>
+                        </a:rPr>
+                        <a:t>Microsoft.NET.Sdk.Web</a:t>
+                      </a:r>
+                      <a:r>
+                        <a:rPr lang="en-US" sz="2000" dirty="0">
+                          <a:solidFill>
+                            <a:srgbClr val="CE9178"/>
+                          </a:solidFill>
+                          <a:latin typeface="Consolas" panose="020B0609020204030204" pitchFamily="49" charset="0"/>
+                        </a:rPr>
+                        <a:t>"</a:t>
+                      </a:r>
+                      <a:r>
+                        <a:rPr lang="en-US" sz="2000" dirty="0">
+                          <a:solidFill>
+                            <a:srgbClr val="569CD6"/>
+                          </a:solidFill>
+                          <a:latin typeface="Consolas" panose="020B0609020204030204" pitchFamily="49" charset="0"/>
+                        </a:rPr>
+                        <a:t>&gt;</a:t>
+                      </a:r>
+                      <a:endParaRPr lang="en-US" sz="2000" dirty="0">
+                        <a:solidFill>
+                          <a:srgbClr val="FAFCFE"/>
+                        </a:solidFill>
+                        <a:latin typeface="Consolas" panose="020B0609020204030204" pitchFamily="49" charset="0"/>
+                      </a:endParaRPr>
+                    </a:p>
+                    <a:p>
+                      <a:pPr marL="0" indent="0">
+                        <a:buNone/>
+                      </a:pPr>
+                      <a:r>
+                        <a:rPr lang="en-US" sz="2000" dirty="0">
+                          <a:solidFill>
+                            <a:srgbClr val="FAFCFE"/>
+                          </a:solidFill>
+                          <a:latin typeface="Consolas" panose="020B0609020204030204" pitchFamily="49" charset="0"/>
+                        </a:rPr>
+                        <a:t>	</a:t>
+                      </a:r>
+                      <a:r>
+                        <a:rPr lang="en-US" sz="2000" dirty="0">
+                          <a:solidFill>
+                            <a:srgbClr val="569CD6"/>
+                          </a:solidFill>
+                          <a:latin typeface="Consolas" panose="020B0609020204030204" pitchFamily="49" charset="0"/>
+                        </a:rPr>
+                        <a:t>&lt;</a:t>
+                      </a:r>
+                      <a:r>
+                        <a:rPr lang="en-US" sz="2000" dirty="0" err="1">
+                          <a:solidFill>
+                            <a:srgbClr val="569CD6"/>
+                          </a:solidFill>
+                          <a:latin typeface="Consolas" panose="020B0609020204030204" pitchFamily="49" charset="0"/>
+                        </a:rPr>
+                        <a:t>PropertyGroup</a:t>
+                      </a:r>
+                      <a:r>
+                        <a:rPr lang="en-US" sz="2000" dirty="0">
+                          <a:solidFill>
+                            <a:srgbClr val="569CD6"/>
+                          </a:solidFill>
+                          <a:latin typeface="Consolas" panose="020B0609020204030204" pitchFamily="49" charset="0"/>
+                        </a:rPr>
+                        <a:t>&gt;</a:t>
+                      </a:r>
+                      <a:endParaRPr lang="en-US" sz="2000" dirty="0">
+                        <a:solidFill>
+                          <a:srgbClr val="FAFCFE"/>
+                        </a:solidFill>
+                        <a:latin typeface="Consolas" panose="020B0609020204030204" pitchFamily="49" charset="0"/>
+                      </a:endParaRPr>
+                    </a:p>
+                    <a:p>
+                      <a:pPr marL="0" indent="0">
+                        <a:buNone/>
+                      </a:pPr>
+                      <a:r>
+                        <a:rPr lang="en-US" sz="2000" dirty="0">
+                          <a:solidFill>
+                            <a:srgbClr val="FAFCFE"/>
+                          </a:solidFill>
+                          <a:latin typeface="Consolas" panose="020B0609020204030204" pitchFamily="49" charset="0"/>
+                        </a:rPr>
+                        <a:t>		</a:t>
+                      </a:r>
+                      <a:r>
+                        <a:rPr lang="en-US" sz="2000" dirty="0">
+                          <a:solidFill>
+                            <a:srgbClr val="569CD6"/>
+                          </a:solidFill>
+                          <a:latin typeface="Consolas" panose="020B0609020204030204" pitchFamily="49" charset="0"/>
+                        </a:rPr>
+                        <a:t>&lt;</a:t>
+                      </a:r>
+                      <a:r>
+                        <a:rPr lang="en-US" sz="2000" dirty="0" err="1">
+                          <a:solidFill>
+                            <a:srgbClr val="569CD6"/>
+                          </a:solidFill>
+                          <a:latin typeface="Consolas" panose="020B0609020204030204" pitchFamily="49" charset="0"/>
+                        </a:rPr>
+                        <a:t>TargetFramework</a:t>
+                      </a:r>
+                      <a:r>
+                        <a:rPr lang="en-US" sz="2000" dirty="0">
+                          <a:solidFill>
+                            <a:srgbClr val="569CD6"/>
+                          </a:solidFill>
+                          <a:latin typeface="Consolas" panose="020B0609020204030204" pitchFamily="49" charset="0"/>
+                        </a:rPr>
+                        <a:t>&gt;</a:t>
+                      </a:r>
+                      <a:r>
+                        <a:rPr lang="en-US" sz="2000" dirty="0">
+                          <a:solidFill>
+                            <a:srgbClr val="CE9178"/>
+                          </a:solidFill>
+                          <a:latin typeface="Consolas" panose="020B0609020204030204" pitchFamily="49" charset="0"/>
+                        </a:rPr>
+                        <a:t>netcoreapp2.0</a:t>
+                      </a:r>
+                      <a:r>
+                        <a:rPr lang="en-US" sz="2000" dirty="0">
+                          <a:solidFill>
+                            <a:srgbClr val="569CD6"/>
+                          </a:solidFill>
+                          <a:latin typeface="Consolas" panose="020B0609020204030204" pitchFamily="49" charset="0"/>
+                        </a:rPr>
+                        <a:t>&lt;/</a:t>
+                      </a:r>
+                      <a:r>
+                        <a:rPr lang="en-US" sz="2000" dirty="0" err="1">
+                          <a:solidFill>
+                            <a:srgbClr val="569CD6"/>
+                          </a:solidFill>
+                          <a:latin typeface="Consolas" panose="020B0609020204030204" pitchFamily="49" charset="0"/>
+                        </a:rPr>
+                        <a:t>TargetFramework</a:t>
+                      </a:r>
+                      <a:r>
+                        <a:rPr lang="en-US" sz="2000" dirty="0">
+                          <a:solidFill>
+                            <a:srgbClr val="569CD6"/>
+                          </a:solidFill>
+                          <a:latin typeface="Consolas" panose="020B0609020204030204" pitchFamily="49" charset="0"/>
+                        </a:rPr>
+                        <a:t>&gt;</a:t>
+                      </a:r>
+                      <a:r>
+                        <a:rPr lang="en-US" sz="2000" dirty="0">
+                          <a:solidFill>
+                            <a:srgbClr val="FAFCFE"/>
+                          </a:solidFill>
+                          <a:latin typeface="Consolas" panose="020B0609020204030204" pitchFamily="49" charset="0"/>
+                        </a:rPr>
+                        <a:t> 			</a:t>
+                      </a:r>
+                      <a:r>
+                        <a:rPr lang="en-US" sz="2000" dirty="0">
+                          <a:solidFill>
+                            <a:srgbClr val="569CD6"/>
+                          </a:solidFill>
+                          <a:latin typeface="Consolas" panose="020B0609020204030204" pitchFamily="49" charset="0"/>
+                        </a:rPr>
+                        <a:t>&lt;/</a:t>
+                      </a:r>
+                      <a:r>
+                        <a:rPr lang="en-US" sz="2000" dirty="0" err="1">
+                          <a:solidFill>
+                            <a:srgbClr val="569CD6"/>
+                          </a:solidFill>
+                          <a:latin typeface="Consolas" panose="020B0609020204030204" pitchFamily="49" charset="0"/>
+                        </a:rPr>
+                        <a:t>PropertyGroup</a:t>
+                      </a:r>
+                      <a:r>
+                        <a:rPr lang="en-US" sz="2000" dirty="0">
+                          <a:solidFill>
+                            <a:srgbClr val="569CD6"/>
+                          </a:solidFill>
+                          <a:latin typeface="Consolas" panose="020B0609020204030204" pitchFamily="49" charset="0"/>
+                        </a:rPr>
+                        <a:t>&gt;</a:t>
+                      </a:r>
+                      <a:endParaRPr lang="en-US" sz="2000" dirty="0">
+                        <a:solidFill>
+                          <a:srgbClr val="000000"/>
+                        </a:solidFill>
+                        <a:latin typeface="Consolas" panose="020B0609020204030204" pitchFamily="49" charset="0"/>
+                      </a:endParaRPr>
+                    </a:p>
+                  </a:txBody>
+                  <a:tcPr>
+                    <a:lnL w="12700" cap="flat" cmpd="sng" algn="ctr">
+                      <a:solidFill>
+                        <a:schemeClr val="tx1"/>
+                      </a:solidFill>
+                      <a:prstDash val="solid"/>
+                      <a:round/>
+                      <a:headEnd type="none" w="med" len="med"/>
+                      <a:tailEnd type="none" w="med" len="med"/>
+                    </a:lnL>
+                    <a:lnR w="12700" cap="flat" cmpd="sng" algn="ctr">
+                      <a:solidFill>
+                        <a:schemeClr val="tx1"/>
+                      </a:solidFill>
+                      <a:prstDash val="solid"/>
+                      <a:round/>
+                      <a:headEnd type="none" w="med" len="med"/>
+                      <a:tailEnd type="none" w="med" len="med"/>
+                    </a:lnR>
+                    <a:lnT w="12700" cap="flat" cmpd="sng" algn="ctr">
+                      <a:solidFill>
+                        <a:schemeClr val="tx1"/>
+                      </a:solidFill>
+                      <a:prstDash val="solid"/>
+                      <a:round/>
+                      <a:headEnd type="none" w="med" len="med"/>
+                      <a:tailEnd type="none" w="med" len="med"/>
+                    </a:lnT>
+                    <a:lnB w="12700" cap="flat" cmpd="sng" algn="ctr">
+                      <a:solidFill>
+                        <a:schemeClr val="tx1"/>
+                      </a:solidFill>
+                      <a:prstDash val="solid"/>
+                      <a:round/>
+                      <a:headEnd type="none" w="med" len="med"/>
+                      <a:tailEnd type="none" w="med" len="med"/>
+                    </a:lnB>
+                    <a:solidFill>
+                      <a:schemeClr val="tx1"/>
+                    </a:solidFill>
+                  </a:tcPr>
+                </a:tc>
+                <a:extLst>
+                  <a:ext uri="{0D108BD9-81ED-4DB2-BD59-A6C34878D82A}">
+                    <a16:rowId xmlns:a16="http://schemas.microsoft.com/office/drawing/2014/main" val="3473222697"/>
+                  </a:ext>
+                </a:extLst>
+              </a:tr>
+            </a:tbl>
+          </a:graphicData>
+        </a:graphic>
+      </p:graphicFrame>
+      <p:sp>
+        <p:nvSpPr>
+          <p:cNvPr id="10" name="Rectangle 9">
+            <a:extLst>
+              <a:ext uri="{FF2B5EF4-FFF2-40B4-BE49-F238E27FC236}">
+                <a16:creationId xmlns:a16="http://schemas.microsoft.com/office/drawing/2014/main" id="{7705916F-C1D6-4249-8953-242EEA5034C9}"/>
+              </a:ext>
+            </a:extLst>
+          </p:cNvPr>
+          <p:cNvSpPr/>
+          <p:nvPr/>
+        </p:nvSpPr>
+        <p:spPr>
+          <a:xfrm>
+            <a:off x="8430966" y="4440754"/>
+            <a:ext cx="2900800" cy="446567"/>
+          </a:xfrm>
+          <a:prstGeom prst="rect">
+            <a:avLst/>
+          </a:prstGeom>
+          <a:ln w="57150">
+            <a:solidFill>
+              <a:schemeClr val="tx1">
+                <a:lumMod val="75000"/>
+              </a:schemeClr>
+            </a:solidFill>
+          </a:ln>
+        </p:spPr>
+        <p:style>
+          <a:lnRef idx="1">
+            <a:schemeClr val="accent1"/>
+          </a:lnRef>
+          <a:fillRef idx="2">
+            <a:schemeClr val="accent1"/>
+          </a:fillRef>
+          <a:effectRef idx="1">
+            <a:schemeClr val="accent1"/>
+          </a:effectRef>
+          <a:fontRef idx="minor">
+            <a:schemeClr val="dk1"/>
+          </a:fontRef>
+        </p:style>
+        <p:txBody>
+          <a:bodyPr rtlCol="0" anchor="ctr"/>
+          <a:lstStyle/>
+          <a:p>
+            <a:pPr algn="ctr"/>
+            <a:r>
+              <a:rPr lang="en-US" b="1" dirty="0"/>
+              <a:t>2xCoreApp.csproj</a:t>
+            </a:r>
+          </a:p>
+        </p:txBody>
+      </p:sp>
+      <p:pic>
+        <p:nvPicPr>
+          <p:cNvPr id="11" name="Picture 10">
+            <a:extLst>
+              <a:ext uri="{FF2B5EF4-FFF2-40B4-BE49-F238E27FC236}">
+                <a16:creationId xmlns:a16="http://schemas.microsoft.com/office/drawing/2014/main" id="{09D12214-CB13-40E1-AF32-E32394C7E88E}"/>
+              </a:ext>
+            </a:extLst>
+          </p:cNvPr>
+          <p:cNvPicPr>
+            <a:picLocks noChangeAspect="1"/>
+          </p:cNvPicPr>
+          <p:nvPr/>
+        </p:nvPicPr>
+        <p:blipFill>
+          <a:blip r:embed="rId3"/>
+          <a:stretch>
+            <a:fillRect/>
+          </a:stretch>
+        </p:blipFill>
+        <p:spPr>
+          <a:xfrm>
+            <a:off x="931228" y="3019196"/>
+            <a:ext cx="3171825" cy="3619500"/>
+          </a:xfrm>
+          <a:prstGeom prst="rect">
+            <a:avLst/>
+          </a:prstGeom>
+          <a:ln w="57150">
+            <a:solidFill>
+              <a:schemeClr val="tx1">
+                <a:lumMod val="75000"/>
+              </a:schemeClr>
+            </a:solidFill>
+          </a:ln>
+          <a:effectLst>
+            <a:outerShdw blurRad="50800" dist="38100" dir="2700000" algn="tl" rotWithShape="0">
+              <a:prstClr val="black">
+                <a:alpha val="40000"/>
+              </a:prstClr>
+            </a:outerShdw>
+          </a:effectLst>
+        </p:spPr>
+      </p:pic>
+      <p:pic>
+        <p:nvPicPr>
+          <p:cNvPr id="12" name="Picture 11">
+            <a:extLst>
+              <a:ext uri="{FF2B5EF4-FFF2-40B4-BE49-F238E27FC236}">
+                <a16:creationId xmlns:a16="http://schemas.microsoft.com/office/drawing/2014/main" id="{D7583CE9-E7BC-4895-B85B-B9E55E78BAB2}"/>
+              </a:ext>
+            </a:extLst>
+          </p:cNvPr>
+          <p:cNvPicPr>
+            <a:picLocks noChangeAspect="1"/>
+          </p:cNvPicPr>
+          <p:nvPr/>
+        </p:nvPicPr>
+        <p:blipFill>
+          <a:blip r:embed="rId4"/>
+          <a:stretch>
+            <a:fillRect/>
+          </a:stretch>
+        </p:blipFill>
+        <p:spPr>
+          <a:xfrm>
+            <a:off x="8420100" y="716915"/>
+            <a:ext cx="2933700" cy="3600450"/>
+          </a:xfrm>
+          <a:prstGeom prst="rect">
+            <a:avLst/>
+          </a:prstGeom>
+          <a:ln w="57150">
+            <a:solidFill>
+              <a:schemeClr val="accent1">
+                <a:lumMod val="50000"/>
+              </a:schemeClr>
+            </a:solidFill>
+          </a:ln>
+          <a:effectLst>
+            <a:outerShdw blurRad="50800" dist="38100" dir="8100000" algn="tr" rotWithShape="0">
+              <a:prstClr val="black">
+                <a:alpha val="40000"/>
+              </a:prstClr>
+            </a:outerShdw>
+          </a:effectLst>
+        </p:spPr>
+      </p:pic>
     </p:spTree>
     <p:extLst>
       <p:ext uri="{BB962C8B-B14F-4D97-AF65-F5344CB8AC3E}">
@@ -11407,6 +12703,366 @@
   <p:clrMapOvr>
     <a:masterClrMapping/>
   </p:clrMapOvr>
+  <p:timing>
+    <p:tnLst>
+      <p:par>
+        <p:cTn id="1" dur="indefinite" restart="never" nodeType="tmRoot">
+          <p:childTnLst>
+            <p:seq concurrent="1" nextAc="seek">
+              <p:cTn id="2" dur="indefinite" nodeType="mainSeq">
+                <p:childTnLst>
+                  <p:par>
+                    <p:cTn id="3" fill="hold">
+                      <p:stCondLst>
+                        <p:cond delay="indefinite"/>
+                      </p:stCondLst>
+                      <p:childTnLst>
+                        <p:par>
+                          <p:cTn id="4" fill="hold">
+                            <p:stCondLst>
+                              <p:cond delay="0"/>
+                            </p:stCondLst>
+                            <p:childTnLst>
+                              <p:par>
+                                <p:cTn id="5" presetID="1" presetClass="entr" presetSubtype="0" fill="hold" nodeType="clickEffect">
+                                  <p:stCondLst>
+                                    <p:cond delay="0"/>
+                                  </p:stCondLst>
+                                  <p:childTnLst>
+                                    <p:set>
+                                      <p:cBhvr>
+                                        <p:cTn id="6" dur="1" fill="hold">
+                                          <p:stCondLst>
+                                            <p:cond delay="0"/>
+                                          </p:stCondLst>
+                                        </p:cTn>
+                                        <p:tgtEl>
+                                          <p:spTgt spid="7"/>
+                                        </p:tgtEl>
+                                        <p:attrNameLst>
+                                          <p:attrName>style.visibility</p:attrName>
+                                        </p:attrNameLst>
+                                      </p:cBhvr>
+                                      <p:to>
+                                        <p:strVal val="visible"/>
+                                      </p:to>
+                                    </p:set>
+                                  </p:childTnLst>
+                                </p:cTn>
+                              </p:par>
+                              <p:par>
+                                <p:cTn id="7" presetID="1" presetClass="entr" presetSubtype="0" fill="hold" grpId="0" nodeType="withEffect">
+                                  <p:stCondLst>
+                                    <p:cond delay="0"/>
+                                  </p:stCondLst>
+                                  <p:childTnLst>
+                                    <p:set>
+                                      <p:cBhvr>
+                                        <p:cTn id="8" dur="1" fill="hold">
+                                          <p:stCondLst>
+                                            <p:cond delay="0"/>
+                                          </p:stCondLst>
+                                        </p:cTn>
+                                        <p:tgtEl>
+                                          <p:spTgt spid="8"/>
+                                        </p:tgtEl>
+                                        <p:attrNameLst>
+                                          <p:attrName>style.visibility</p:attrName>
+                                        </p:attrNameLst>
+                                      </p:cBhvr>
+                                      <p:to>
+                                        <p:strVal val="visible"/>
+                                      </p:to>
+                                    </p:set>
+                                  </p:childTnLst>
+                                </p:cTn>
+                              </p:par>
+                            </p:childTnLst>
+                          </p:cTn>
+                        </p:par>
+                      </p:childTnLst>
+                    </p:cTn>
+                  </p:par>
+                  <p:par>
+                    <p:cTn id="9" fill="hold">
+                      <p:stCondLst>
+                        <p:cond delay="indefinite"/>
+                      </p:stCondLst>
+                      <p:childTnLst>
+                        <p:par>
+                          <p:cTn id="10" fill="hold">
+                            <p:stCondLst>
+                              <p:cond delay="0"/>
+                            </p:stCondLst>
+                            <p:childTnLst>
+                              <p:par>
+                                <p:cTn id="11" presetID="2" presetClass="entr" presetSubtype="4" fill="hold" nodeType="clickEffect">
+                                  <p:stCondLst>
+                                    <p:cond delay="0"/>
+                                  </p:stCondLst>
+                                  <p:childTnLst>
+                                    <p:set>
+                                      <p:cBhvr>
+                                        <p:cTn id="12" dur="1" fill="hold">
+                                          <p:stCondLst>
+                                            <p:cond delay="0"/>
+                                          </p:stCondLst>
+                                        </p:cTn>
+                                        <p:tgtEl>
+                                          <p:spTgt spid="12"/>
+                                        </p:tgtEl>
+                                        <p:attrNameLst>
+                                          <p:attrName>style.visibility</p:attrName>
+                                        </p:attrNameLst>
+                                      </p:cBhvr>
+                                      <p:to>
+                                        <p:strVal val="visible"/>
+                                      </p:to>
+                                    </p:set>
+                                    <p:anim calcmode="lin" valueType="num">
+                                      <p:cBhvr additive="base">
+                                        <p:cTn id="13" dur="500" fill="hold"/>
+                                        <p:tgtEl>
+                                          <p:spTgt spid="12"/>
+                                        </p:tgtEl>
+                                        <p:attrNameLst>
+                                          <p:attrName>ppt_x</p:attrName>
+                                        </p:attrNameLst>
+                                      </p:cBhvr>
+                                      <p:tavLst>
+                                        <p:tav tm="0">
+                                          <p:val>
+                                            <p:strVal val="#ppt_x"/>
+                                          </p:val>
+                                        </p:tav>
+                                        <p:tav tm="100000">
+                                          <p:val>
+                                            <p:strVal val="#ppt_x"/>
+                                          </p:val>
+                                        </p:tav>
+                                      </p:tavLst>
+                                    </p:anim>
+                                    <p:anim calcmode="lin" valueType="num">
+                                      <p:cBhvr additive="base">
+                                        <p:cTn id="14" dur="500" fill="hold"/>
+                                        <p:tgtEl>
+                                          <p:spTgt spid="12"/>
+                                        </p:tgtEl>
+                                        <p:attrNameLst>
+                                          <p:attrName>ppt_y</p:attrName>
+                                        </p:attrNameLst>
+                                      </p:cBhvr>
+                                      <p:tavLst>
+                                        <p:tav tm="0">
+                                          <p:val>
+                                            <p:strVal val="1+#ppt_h/2"/>
+                                          </p:val>
+                                        </p:tav>
+                                        <p:tav tm="100000">
+                                          <p:val>
+                                            <p:strVal val="#ppt_y"/>
+                                          </p:val>
+                                        </p:tav>
+                                      </p:tavLst>
+                                    </p:anim>
+                                  </p:childTnLst>
+                                </p:cTn>
+                              </p:par>
+                            </p:childTnLst>
+                          </p:cTn>
+                        </p:par>
+                      </p:childTnLst>
+                    </p:cTn>
+                  </p:par>
+                  <p:par>
+                    <p:cTn id="15" fill="hold">
+                      <p:stCondLst>
+                        <p:cond delay="indefinite"/>
+                      </p:stCondLst>
+                      <p:childTnLst>
+                        <p:par>
+                          <p:cTn id="16" fill="hold">
+                            <p:stCondLst>
+                              <p:cond delay="0"/>
+                            </p:stCondLst>
+                            <p:childTnLst>
+                              <p:par>
+                                <p:cTn id="17" presetID="1" presetClass="entr" presetSubtype="0" fill="hold" nodeType="clickEffect">
+                                  <p:stCondLst>
+                                    <p:cond delay="0"/>
+                                  </p:stCondLst>
+                                  <p:childTnLst>
+                                    <p:set>
+                                      <p:cBhvr>
+                                        <p:cTn id="18" dur="1" fill="hold">
+                                          <p:stCondLst>
+                                            <p:cond delay="0"/>
+                                          </p:stCondLst>
+                                        </p:cTn>
+                                        <p:tgtEl>
+                                          <p:spTgt spid="9"/>
+                                        </p:tgtEl>
+                                        <p:attrNameLst>
+                                          <p:attrName>style.visibility</p:attrName>
+                                        </p:attrNameLst>
+                                      </p:cBhvr>
+                                      <p:to>
+                                        <p:strVal val="visible"/>
+                                      </p:to>
+                                    </p:set>
+                                  </p:childTnLst>
+                                </p:cTn>
+                              </p:par>
+                              <p:par>
+                                <p:cTn id="19" presetID="1" presetClass="entr" presetSubtype="0" fill="hold" grpId="0" nodeType="withEffect">
+                                  <p:stCondLst>
+                                    <p:cond delay="0"/>
+                                  </p:stCondLst>
+                                  <p:childTnLst>
+                                    <p:set>
+                                      <p:cBhvr>
+                                        <p:cTn id="20" dur="1" fill="hold">
+                                          <p:stCondLst>
+                                            <p:cond delay="0"/>
+                                          </p:stCondLst>
+                                        </p:cTn>
+                                        <p:tgtEl>
+                                          <p:spTgt spid="10"/>
+                                        </p:tgtEl>
+                                        <p:attrNameLst>
+                                          <p:attrName>style.visibility</p:attrName>
+                                        </p:attrNameLst>
+                                      </p:cBhvr>
+                                      <p:to>
+                                        <p:strVal val="visible"/>
+                                      </p:to>
+                                    </p:set>
+                                  </p:childTnLst>
+                                </p:cTn>
+                              </p:par>
+                            </p:childTnLst>
+                          </p:cTn>
+                        </p:par>
+                      </p:childTnLst>
+                    </p:cTn>
+                  </p:par>
+                  <p:par>
+                    <p:cTn id="21" fill="hold">
+                      <p:stCondLst>
+                        <p:cond delay="indefinite"/>
+                      </p:stCondLst>
+                      <p:childTnLst>
+                        <p:par>
+                          <p:cTn id="22" fill="hold">
+                            <p:stCondLst>
+                              <p:cond delay="0"/>
+                            </p:stCondLst>
+                            <p:childTnLst>
+                              <p:par>
+                                <p:cTn id="23" presetID="2" presetClass="entr" presetSubtype="4" fill="hold" nodeType="clickEffect">
+                                  <p:stCondLst>
+                                    <p:cond delay="0"/>
+                                  </p:stCondLst>
+                                  <p:childTnLst>
+                                    <p:set>
+                                      <p:cBhvr>
+                                        <p:cTn id="24" dur="1" fill="hold">
+                                          <p:stCondLst>
+                                            <p:cond delay="0"/>
+                                          </p:stCondLst>
+                                        </p:cTn>
+                                        <p:tgtEl>
+                                          <p:spTgt spid="11"/>
+                                        </p:tgtEl>
+                                        <p:attrNameLst>
+                                          <p:attrName>style.visibility</p:attrName>
+                                        </p:attrNameLst>
+                                      </p:cBhvr>
+                                      <p:to>
+                                        <p:strVal val="visible"/>
+                                      </p:to>
+                                    </p:set>
+                                    <p:anim calcmode="lin" valueType="num">
+                                      <p:cBhvr additive="base">
+                                        <p:cTn id="25" dur="500" fill="hold"/>
+                                        <p:tgtEl>
+                                          <p:spTgt spid="11"/>
+                                        </p:tgtEl>
+                                        <p:attrNameLst>
+                                          <p:attrName>ppt_x</p:attrName>
+                                        </p:attrNameLst>
+                                      </p:cBhvr>
+                                      <p:tavLst>
+                                        <p:tav tm="0">
+                                          <p:val>
+                                            <p:strVal val="#ppt_x"/>
+                                          </p:val>
+                                        </p:tav>
+                                        <p:tav tm="100000">
+                                          <p:val>
+                                            <p:strVal val="#ppt_x"/>
+                                          </p:val>
+                                        </p:tav>
+                                      </p:tavLst>
+                                    </p:anim>
+                                    <p:anim calcmode="lin" valueType="num">
+                                      <p:cBhvr additive="base">
+                                        <p:cTn id="26" dur="500" fill="hold"/>
+                                        <p:tgtEl>
+                                          <p:spTgt spid="11"/>
+                                        </p:tgtEl>
+                                        <p:attrNameLst>
+                                          <p:attrName>ppt_y</p:attrName>
+                                        </p:attrNameLst>
+                                      </p:cBhvr>
+                                      <p:tavLst>
+                                        <p:tav tm="0">
+                                          <p:val>
+                                            <p:strVal val="1+#ppt_h/2"/>
+                                          </p:val>
+                                        </p:tav>
+                                        <p:tav tm="100000">
+                                          <p:val>
+                                            <p:strVal val="#ppt_y"/>
+                                          </p:val>
+                                        </p:tav>
+                                      </p:tavLst>
+                                    </p:anim>
+                                  </p:childTnLst>
+                                </p:cTn>
+                              </p:par>
+                            </p:childTnLst>
+                          </p:cTn>
+                        </p:par>
+                      </p:childTnLst>
+                    </p:cTn>
+                  </p:par>
+                </p:childTnLst>
+              </p:cTn>
+              <p:prevCondLst>
+                <p:cond evt="onPrev" delay="0">
+                  <p:tgtEl>
+                    <p:sldTgt/>
+                  </p:tgtEl>
+                </p:cond>
+              </p:prevCondLst>
+              <p:nextCondLst>
+                <p:cond evt="onNext" delay="0">
+                  <p:tgtEl>
+                    <p:sldTgt/>
+                  </p:tgtEl>
+                </p:cond>
+              </p:nextCondLst>
+            </p:seq>
+          </p:childTnLst>
+        </p:cTn>
+      </p:par>
+    </p:tnLst>
+    <p:bldLst>
+      <p:bldP spid="8" grpId="0" animBg="1"/>
+      <p:bldP spid="10" grpId="0" animBg="1"/>
+    </p:bldLst>
+  </p:timing>
 </p:sld>
 </file>
 

</xml_diff>

<commit_message>
Add animations to slide
</commit_message>
<xml_diff>
--- a/Whats New in ASP.NET Core 2.0.pptx
+++ b/Whats New in ASP.NET Core 2.0.pptx
@@ -14380,6 +14380,286 @@
   <p:clrMapOvr>
     <a:masterClrMapping/>
   </p:clrMapOvr>
+  <p:timing>
+    <p:tnLst>
+      <p:par>
+        <p:cTn id="1" dur="indefinite" restart="never" nodeType="tmRoot">
+          <p:childTnLst>
+            <p:seq concurrent="1" nextAc="seek">
+              <p:cTn id="2" dur="indefinite" nodeType="mainSeq">
+                <p:childTnLst>
+                  <p:par>
+                    <p:cTn id="3" fill="hold">
+                      <p:stCondLst>
+                        <p:cond delay="indefinite"/>
+                      </p:stCondLst>
+                      <p:childTnLst>
+                        <p:par>
+                          <p:cTn id="4" fill="hold">
+                            <p:stCondLst>
+                              <p:cond delay="0"/>
+                            </p:stCondLst>
+                            <p:childTnLst>
+                              <p:par>
+                                <p:cTn id="5" presetID="1" presetClass="entr" presetSubtype="0" fill="hold" nodeType="clickEffect">
+                                  <p:stCondLst>
+                                    <p:cond delay="0"/>
+                                  </p:stCondLst>
+                                  <p:childTnLst>
+                                    <p:set>
+                                      <p:cBhvr>
+                                        <p:cTn id="6" dur="1" fill="hold">
+                                          <p:stCondLst>
+                                            <p:cond delay="0"/>
+                                          </p:stCondLst>
+                                        </p:cTn>
+                                        <p:tgtEl>
+                                          <p:spTgt spid="11">
+                                            <p:txEl>
+                                              <p:pRg st="1" end="1"/>
+                                            </p:txEl>
+                                          </p:spTgt>
+                                        </p:tgtEl>
+                                        <p:attrNameLst>
+                                          <p:attrName>style.visibility</p:attrName>
+                                        </p:attrNameLst>
+                                      </p:cBhvr>
+                                      <p:to>
+                                        <p:strVal val="visible"/>
+                                      </p:to>
+                                    </p:set>
+                                  </p:childTnLst>
+                                </p:cTn>
+                              </p:par>
+                              <p:par>
+                                <p:cTn id="7" presetID="1" presetClass="entr" presetSubtype="0" fill="hold" nodeType="withEffect">
+                                  <p:stCondLst>
+                                    <p:cond delay="0"/>
+                                  </p:stCondLst>
+                                  <p:childTnLst>
+                                    <p:set>
+                                      <p:cBhvr>
+                                        <p:cTn id="8" dur="1" fill="hold">
+                                          <p:stCondLst>
+                                            <p:cond delay="0"/>
+                                          </p:stCondLst>
+                                        </p:cTn>
+                                        <p:tgtEl>
+                                          <p:spTgt spid="11">
+                                            <p:txEl>
+                                              <p:pRg st="2" end="2"/>
+                                            </p:txEl>
+                                          </p:spTgt>
+                                        </p:tgtEl>
+                                        <p:attrNameLst>
+                                          <p:attrName>style.visibility</p:attrName>
+                                        </p:attrNameLst>
+                                      </p:cBhvr>
+                                      <p:to>
+                                        <p:strVal val="visible"/>
+                                      </p:to>
+                                    </p:set>
+                                  </p:childTnLst>
+                                </p:cTn>
+                              </p:par>
+                            </p:childTnLst>
+                          </p:cTn>
+                        </p:par>
+                      </p:childTnLst>
+                    </p:cTn>
+                  </p:par>
+                  <p:par>
+                    <p:cTn id="9" fill="hold">
+                      <p:stCondLst>
+                        <p:cond delay="indefinite"/>
+                      </p:stCondLst>
+                      <p:childTnLst>
+                        <p:par>
+                          <p:cTn id="10" fill="hold">
+                            <p:stCondLst>
+                              <p:cond delay="0"/>
+                            </p:stCondLst>
+                            <p:childTnLst>
+                              <p:par>
+                                <p:cTn id="11" presetID="1" presetClass="entr" presetSubtype="0" fill="hold" nodeType="clickEffect">
+                                  <p:stCondLst>
+                                    <p:cond delay="0"/>
+                                  </p:stCondLst>
+                                  <p:childTnLst>
+                                    <p:set>
+                                      <p:cBhvr>
+                                        <p:cTn id="12" dur="1" fill="hold">
+                                          <p:stCondLst>
+                                            <p:cond delay="0"/>
+                                          </p:stCondLst>
+                                        </p:cTn>
+                                        <p:tgtEl>
+                                          <p:spTgt spid="3"/>
+                                        </p:tgtEl>
+                                        <p:attrNameLst>
+                                          <p:attrName>style.visibility</p:attrName>
+                                        </p:attrNameLst>
+                                      </p:cBhvr>
+                                      <p:to>
+                                        <p:strVal val="visible"/>
+                                      </p:to>
+                                    </p:set>
+                                  </p:childTnLst>
+                                </p:cTn>
+                              </p:par>
+                            </p:childTnLst>
+                          </p:cTn>
+                        </p:par>
+                      </p:childTnLst>
+                    </p:cTn>
+                  </p:par>
+                  <p:par>
+                    <p:cTn id="13" fill="hold">
+                      <p:stCondLst>
+                        <p:cond delay="indefinite"/>
+                      </p:stCondLst>
+                      <p:childTnLst>
+                        <p:par>
+                          <p:cTn id="14" fill="hold">
+                            <p:stCondLst>
+                              <p:cond delay="0"/>
+                            </p:stCondLst>
+                            <p:childTnLst>
+                              <p:par>
+                                <p:cTn id="15" presetID="1" presetClass="entr" presetSubtype="0" fill="hold" nodeType="clickEffect">
+                                  <p:stCondLst>
+                                    <p:cond delay="0"/>
+                                  </p:stCondLst>
+                                  <p:childTnLst>
+                                    <p:set>
+                                      <p:cBhvr>
+                                        <p:cTn id="16" dur="1" fill="hold">
+                                          <p:stCondLst>
+                                            <p:cond delay="0"/>
+                                          </p:stCondLst>
+                                        </p:cTn>
+                                        <p:tgtEl>
+                                          <p:spTgt spid="11">
+                                            <p:txEl>
+                                              <p:pRg st="6" end="6"/>
+                                            </p:txEl>
+                                          </p:spTgt>
+                                        </p:tgtEl>
+                                        <p:attrNameLst>
+                                          <p:attrName>style.visibility</p:attrName>
+                                        </p:attrNameLst>
+                                      </p:cBhvr>
+                                      <p:to>
+                                        <p:strVal val="visible"/>
+                                      </p:to>
+                                    </p:set>
+                                  </p:childTnLst>
+                                </p:cTn>
+                              </p:par>
+                              <p:par>
+                                <p:cTn id="17" presetID="1" presetClass="entr" presetSubtype="0" fill="hold" nodeType="withEffect">
+                                  <p:stCondLst>
+                                    <p:cond delay="0"/>
+                                  </p:stCondLst>
+                                  <p:childTnLst>
+                                    <p:set>
+                                      <p:cBhvr>
+                                        <p:cTn id="18" dur="1" fill="hold">
+                                          <p:stCondLst>
+                                            <p:cond delay="0"/>
+                                          </p:stCondLst>
+                                        </p:cTn>
+                                        <p:tgtEl>
+                                          <p:spTgt spid="11">
+                                            <p:txEl>
+                                              <p:pRg st="7" end="7"/>
+                                            </p:txEl>
+                                          </p:spTgt>
+                                        </p:tgtEl>
+                                        <p:attrNameLst>
+                                          <p:attrName>style.visibility</p:attrName>
+                                        </p:attrNameLst>
+                                      </p:cBhvr>
+                                      <p:to>
+                                        <p:strVal val="visible"/>
+                                      </p:to>
+                                    </p:set>
+                                  </p:childTnLst>
+                                </p:cTn>
+                              </p:par>
+                            </p:childTnLst>
+                          </p:cTn>
+                        </p:par>
+                      </p:childTnLst>
+                    </p:cTn>
+                  </p:par>
+                  <p:par>
+                    <p:cTn id="19" fill="hold">
+                      <p:stCondLst>
+                        <p:cond delay="indefinite"/>
+                      </p:stCondLst>
+                      <p:childTnLst>
+                        <p:par>
+                          <p:cTn id="20" fill="hold">
+                            <p:stCondLst>
+                              <p:cond delay="0"/>
+                            </p:stCondLst>
+                            <p:childTnLst>
+                              <p:par>
+                                <p:cTn id="21" presetID="1" presetClass="entr" presetSubtype="0" fill="hold" nodeType="clickEffect">
+                                  <p:stCondLst>
+                                    <p:cond delay="0"/>
+                                  </p:stCondLst>
+                                  <p:childTnLst>
+                                    <p:set>
+                                      <p:cBhvr>
+                                        <p:cTn id="22" dur="1" fill="hold">
+                                          <p:stCondLst>
+                                            <p:cond delay="0"/>
+                                          </p:stCondLst>
+                                        </p:cTn>
+                                        <p:tgtEl>
+                                          <p:spTgt spid="4"/>
+                                        </p:tgtEl>
+                                        <p:attrNameLst>
+                                          <p:attrName>style.visibility</p:attrName>
+                                        </p:attrNameLst>
+                                      </p:cBhvr>
+                                      <p:to>
+                                        <p:strVal val="visible"/>
+                                      </p:to>
+                                    </p:set>
+                                  </p:childTnLst>
+                                </p:cTn>
+                              </p:par>
+                            </p:childTnLst>
+                          </p:cTn>
+                        </p:par>
+                      </p:childTnLst>
+                    </p:cTn>
+                  </p:par>
+                </p:childTnLst>
+              </p:cTn>
+              <p:prevCondLst>
+                <p:cond evt="onPrev" delay="0">
+                  <p:tgtEl>
+                    <p:sldTgt/>
+                  </p:tgtEl>
+                </p:cond>
+              </p:prevCondLst>
+              <p:nextCondLst>
+                <p:cond evt="onNext" delay="0">
+                  <p:tgtEl>
+                    <p:sldTgt/>
+                  </p:tgtEl>
+                </p:cond>
+              </p:nextCondLst>
+            </p:seq>
+          </p:childTnLst>
+        </p:cTn>
+      </p:par>
+    </p:tnLst>
+  </p:timing>
 </p:sld>
 </file>
 

</xml_diff>

<commit_message>
Update Runtime Store slide
</commit_message>
<xml_diff>
--- a/Whats New in ASP.NET Core 2.0.pptx
+++ b/Whats New in ASP.NET Core 2.0.pptx
@@ -1221,7 +1221,16 @@
           <a:bodyPr/>
           <a:lstStyle/>
           <a:p>
-            <a:endParaRPr lang="en-US"/>
+            <a:r>
+              <a:rPr lang="en-US" dirty="0"/>
+              <a:t>- all EF Core &amp; ASP.NET Core deps</a:t>
+            </a:r>
+          </a:p>
+          <a:p>
+            <a:r>
+              <a:rPr lang="en-US" dirty="0"/>
+              <a:t>- FDD only</a:t>
+            </a:r>
           </a:p>
         </p:txBody>
       </p:sp>
@@ -14085,56 +14094,292 @@
           </a:p>
         </p:txBody>
       </p:sp>
-      <p:sp>
-        <p:nvSpPr>
-          <p:cNvPr id="4" name="Content Placeholder 3">
+      <p:graphicFrame>
+        <p:nvGraphicFramePr>
+          <p:cNvPr id="3" name="Content Placeholder 2">
             <a:extLst>
               <a:ext uri="{FF2B5EF4-FFF2-40B4-BE49-F238E27FC236}">
-                <a16:creationId xmlns:a16="http://schemas.microsoft.com/office/drawing/2014/main" id="{5047F788-AF1A-4ED1-AD0A-5BD1321974EF}"/>
+                <a16:creationId xmlns:a16="http://schemas.microsoft.com/office/drawing/2014/main" id="{758ED536-B0FF-4C2F-B370-CFC88E911737}"/>
               </a:ext>
             </a:extLst>
           </p:cNvPr>
-          <p:cNvSpPr>
-            <a:spLocks noGrp="1"/>
-          </p:cNvSpPr>
+          <p:cNvGraphicFramePr>
+            <a:graphicFrameLocks noGrp="1"/>
+          </p:cNvGraphicFramePr>
           <p:nvPr>
             <p:ph sz="half" idx="1"/>
+            <p:extLst>
+              <p:ext uri="{D42A27DB-BD31-4B8C-83A1-F6EECF244321}">
+                <p14:modId xmlns:p14="http://schemas.microsoft.com/office/powerpoint/2010/main" val="194765330"/>
+              </p:ext>
+            </p:extLst>
           </p:nvPr>
-        </p:nvSpPr>
-        <p:spPr/>
-        <p:txBody>
-          <a:bodyPr/>
-          <a:lstStyle/>
-          <a:p>
-            <a:endParaRPr lang="en-US" dirty="0"/>
-          </a:p>
-        </p:txBody>
-      </p:sp>
-      <p:sp>
-        <p:nvSpPr>
-          <p:cNvPr id="5" name="Content Placeholder 4">
+        </p:nvGraphicFramePr>
+        <p:xfrm>
+          <a:off x="838198" y="1825623"/>
+          <a:ext cx="10515602" cy="1413334"/>
+        </p:xfrm>
+        <a:graphic>
+          <a:graphicData uri="http://schemas.openxmlformats.org/drawingml/2006/table">
+            <a:tbl>
+              <a:tblPr firstRow="1" bandRow="1">
+                <a:tableStyleId>{125E5076-3810-47DD-B79F-674D7AD40C01}</a:tableStyleId>
+              </a:tblPr>
+              <a:tblGrid>
+                <a:gridCol w="5257801">
+                  <a:extLst>
+                    <a:ext uri="{9D8B030D-6E8A-4147-A177-3AD203B41FA5}">
+                      <a16:colId xmlns:a16="http://schemas.microsoft.com/office/drawing/2014/main" val="646715418"/>
+                    </a:ext>
+                  </a:extLst>
+                </a:gridCol>
+                <a:gridCol w="5257801">
+                  <a:extLst>
+                    <a:ext uri="{9D8B030D-6E8A-4147-A177-3AD203B41FA5}">
+                      <a16:colId xmlns:a16="http://schemas.microsoft.com/office/drawing/2014/main" val="70901629"/>
+                    </a:ext>
+                  </a:extLst>
+                </a:gridCol>
+              </a:tblGrid>
+              <a:tr h="706667">
+                <a:tc>
+                  <a:txBody>
+                    <a:bodyPr/>
+                    <a:lstStyle/>
+                    <a:p>
+                      <a:endParaRPr lang="en-US" dirty="0"/>
+                    </a:p>
+                  </a:txBody>
+                  <a:tcPr/>
+                </a:tc>
+                <a:tc>
+                  <a:txBody>
+                    <a:bodyPr/>
+                    <a:lstStyle/>
+                    <a:p>
+                      <a:endParaRPr lang="en-US" dirty="0"/>
+                    </a:p>
+                  </a:txBody>
+                  <a:tcPr/>
+                </a:tc>
+                <a:extLst>
+                  <a:ext uri="{0D108BD9-81ED-4DB2-BD59-A6C34878D82A}">
+                    <a16:rowId xmlns:a16="http://schemas.microsoft.com/office/drawing/2014/main" val="695694885"/>
+                  </a:ext>
+                </a:extLst>
+              </a:tr>
+              <a:tr h="706667">
+                <a:tc>
+                  <a:txBody>
+                    <a:bodyPr/>
+                    <a:lstStyle/>
+                    <a:p>
+                      <a:r>
+                        <a:rPr lang="en-US" dirty="0"/>
+                        <a:t>C:\Program Files\</a:t>
+                      </a:r>
+                      <a:r>
+                        <a:rPr lang="en-US" dirty="0" err="1"/>
+                        <a:t>dotnet</a:t>
+                      </a:r>
+                      <a:r>
+                        <a:rPr lang="en-US" dirty="0"/>
+                        <a:t>\store</a:t>
+                      </a:r>
+                    </a:p>
+                  </a:txBody>
+                  <a:tcPr/>
+                </a:tc>
+                <a:tc>
+                  <a:txBody>
+                    <a:bodyPr/>
+                    <a:lstStyle/>
+                    <a:p>
+                      <a:r>
+                        <a:rPr lang="en-US" sz="1800" kern="1200" dirty="0">
+                          <a:effectLst/>
+                        </a:rPr>
+                        <a:t>/</a:t>
+                      </a:r>
+                      <a:r>
+                        <a:rPr lang="en-US" sz="1800" kern="1200" dirty="0" err="1">
+                          <a:effectLst/>
+                        </a:rPr>
+                        <a:t>usr</a:t>
+                      </a:r>
+                      <a:r>
+                        <a:rPr lang="en-US" sz="1800" kern="1200" dirty="0">
+                          <a:effectLst/>
+                        </a:rPr>
+                        <a:t>/local/share/</a:t>
+                      </a:r>
+                      <a:r>
+                        <a:rPr lang="en-US" sz="1800" kern="1200" dirty="0" err="1">
+                          <a:effectLst/>
+                        </a:rPr>
+                        <a:t>dotnet</a:t>
+                      </a:r>
+                      <a:r>
+                        <a:rPr lang="en-US" sz="1800" kern="1200" dirty="0">
+                          <a:effectLst/>
+                        </a:rPr>
+                        <a:t>/store</a:t>
+                      </a:r>
+                      <a:endParaRPr lang="en-US" i="0" dirty="0"/>
+                    </a:p>
+                  </a:txBody>
+                  <a:tcPr/>
+                </a:tc>
+                <a:extLst>
+                  <a:ext uri="{0D108BD9-81ED-4DB2-BD59-A6C34878D82A}">
+                    <a16:rowId xmlns:a16="http://schemas.microsoft.com/office/drawing/2014/main" val="1420948474"/>
+                  </a:ext>
+                </a:extLst>
+              </a:tr>
+            </a:tbl>
+          </a:graphicData>
+        </a:graphic>
+      </p:graphicFrame>
+      <p:pic>
+        <p:nvPicPr>
+          <p:cNvPr id="6" name="Picture 6" descr="C:\temp\WinAzure_rgb_Wht_S.png">
             <a:extLst>
               <a:ext uri="{FF2B5EF4-FFF2-40B4-BE49-F238E27FC236}">
-                <a16:creationId xmlns:a16="http://schemas.microsoft.com/office/drawing/2014/main" id="{B9012F0A-1710-4125-BBBE-3F11CE106E8A}"/>
+                <a16:creationId xmlns:a16="http://schemas.microsoft.com/office/drawing/2014/main" id="{3780108E-D6B1-45FD-BACD-A8B320583875}"/>
               </a:ext>
             </a:extLst>
           </p:cNvPr>
-          <p:cNvSpPr>
-            <a:spLocks noGrp="1"/>
-          </p:cNvSpPr>
+          <p:cNvPicPr>
+            <a:picLocks noChangeAspect="1" noChangeArrowheads="1"/>
+          </p:cNvPicPr>
+          <p:nvPr/>
+        </p:nvPicPr>
+        <p:blipFill rotWithShape="1">
+          <a:blip r:embed="rId3" cstate="print">
+            <a:extLst>
+              <a:ext uri="{28A0092B-C50C-407E-A947-70E740481C1C}">
+                <a14:useLocalDpi xmlns:a14="http://schemas.microsoft.com/office/drawing/2010/main" val="0"/>
+              </a:ext>
+            </a:extLst>
+          </a:blip>
+          <a:srcRect l="3371" t="15460" r="80628" b="15496"/>
+          <a:stretch/>
+        </p:blipFill>
+        <p:spPr bwMode="auto">
+          <a:xfrm>
+            <a:off x="980561" y="1965024"/>
+            <a:ext cx="455848" cy="462964"/>
+          </a:xfrm>
+          <a:prstGeom prst="rect">
+            <a:avLst/>
+          </a:prstGeom>
+          <a:noFill/>
+          <a:extLst>
+            <a:ext uri="{909E8E84-426E-40DD-AFC4-6F175D3DCCD1}">
+              <a14:hiddenFill xmlns:a14="http://schemas.microsoft.com/office/drawing/2010/main">
+                <a:solidFill>
+                  <a:srgbClr val="FFFFFF"/>
+                </a:solidFill>
+              </a14:hiddenFill>
+            </a:ext>
+          </a:extLst>
+        </p:spPr>
+      </p:pic>
+      <p:pic>
+        <p:nvPicPr>
+          <p:cNvPr id="7" name="Picture 6">
+            <a:extLst>
+              <a:ext uri="{FF2B5EF4-FFF2-40B4-BE49-F238E27FC236}">
+                <a16:creationId xmlns:a16="http://schemas.microsoft.com/office/drawing/2014/main" id="{70E441B1-B5FB-4333-8F1A-E091C0B2CAE1}"/>
+              </a:ext>
+            </a:extLst>
+          </p:cNvPr>
+          <p:cNvPicPr>
+            <a:picLocks noChangeAspect="1"/>
+          </p:cNvPicPr>
+          <p:nvPr/>
+        </p:nvPicPr>
+        <p:blipFill>
+          <a:blip r:embed="rId4"/>
+          <a:stretch>
+            <a:fillRect/>
+          </a:stretch>
+        </p:blipFill>
+        <p:spPr>
+          <a:xfrm>
+            <a:off x="6267154" y="1940452"/>
+            <a:ext cx="1133954" cy="512108"/>
+          </a:xfrm>
+          <a:prstGeom prst="rect">
+            <a:avLst/>
+          </a:prstGeom>
+        </p:spPr>
+      </p:pic>
+      <p:pic>
+        <p:nvPicPr>
+          <p:cNvPr id="5" name="Content Placeholder 4" descr="A screenshot of a cell phone&#10;&#10;Description generated with very high confidence">
+            <a:extLst>
+              <a:ext uri="{FF2B5EF4-FFF2-40B4-BE49-F238E27FC236}">
+                <a16:creationId xmlns:a16="http://schemas.microsoft.com/office/drawing/2014/main" id="{0ACED995-33FD-4BCB-9B17-8B8B3B9BA11F}"/>
+              </a:ext>
+            </a:extLst>
+          </p:cNvPr>
+          <p:cNvPicPr>
+            <a:picLocks noGrp="1" noChangeAspect="1"/>
+          </p:cNvPicPr>
           <p:nvPr>
             <p:ph sz="half" idx="2"/>
           </p:nvPr>
-        </p:nvSpPr>
-        <p:spPr/>
-        <p:txBody>
-          <a:bodyPr/>
-          <a:lstStyle/>
-          <a:p>
-            <a:endParaRPr lang="en-US"/>
-          </a:p>
-        </p:txBody>
-      </p:sp>
+        </p:nvPicPr>
+        <p:blipFill>
+          <a:blip r:embed="rId5">
+            <a:extLst>
+              <a:ext uri="{28A0092B-C50C-407E-A947-70E740481C1C}">
+                <a14:useLocalDpi xmlns:a14="http://schemas.microsoft.com/office/drawing/2010/main" val="0"/>
+              </a:ext>
+            </a:extLst>
+          </a:blip>
+          <a:stretch>
+            <a:fillRect/>
+          </a:stretch>
+        </p:blipFill>
+        <p:spPr>
+          <a:xfrm>
+            <a:off x="5896778" y="3205510"/>
+            <a:ext cx="5181600" cy="3631678"/>
+          </a:xfrm>
+        </p:spPr>
+      </p:pic>
+      <p:pic>
+        <p:nvPicPr>
+          <p:cNvPr id="8" name="Picture 7">
+            <a:extLst>
+              <a:ext uri="{FF2B5EF4-FFF2-40B4-BE49-F238E27FC236}">
+                <a16:creationId xmlns:a16="http://schemas.microsoft.com/office/drawing/2014/main" id="{8F56F418-14FF-4878-B4DD-249A50B46860}"/>
+              </a:ext>
+            </a:extLst>
+          </p:cNvPr>
+          <p:cNvPicPr>
+            <a:picLocks noChangeAspect="1"/>
+          </p:cNvPicPr>
+          <p:nvPr/>
+        </p:nvPicPr>
+        <p:blipFill>
+          <a:blip r:embed="rId6"/>
+          <a:stretch>
+            <a:fillRect/>
+          </a:stretch>
+        </p:blipFill>
+        <p:spPr>
+          <a:xfrm>
+            <a:off x="980561" y="3373892"/>
+            <a:ext cx="4385946" cy="3294915"/>
+          </a:xfrm>
+          <a:prstGeom prst="rect">
+            <a:avLst/>
+          </a:prstGeom>
+        </p:spPr>
+      </p:pic>
     </p:spTree>
     <p:extLst>
       <p:ext uri="{BB962C8B-B14F-4D97-AF65-F5344CB8AC3E}">

</xml_diff>

<commit_message>
Remove transition from docs slide
</commit_message>
<xml_diff>
--- a/Whats New in ASP.NET Core 2.0.pptx
+++ b/Whats New in ASP.NET Core 2.0.pptx
@@ -15627,16 +15627,12 @@
   <p:clrMapOvr>
     <a:masterClrMapping/>
   </p:clrMapOvr>
-  <mc:AlternateContent xmlns:mc="http://schemas.openxmlformats.org/markup-compatibility/2006" xmlns:p14="http://schemas.microsoft.com/office/powerpoint/2010/main">
-    <mc:Choice Requires="p14">
-      <p:transition spd="med" p14:dur="700" advTm="10000">
-        <p:fade/>
-      </p:transition>
+  <mc:AlternateContent xmlns:mc="http://schemas.openxmlformats.org/markup-compatibility/2006">
+    <mc:Choice xmlns:p14="http://schemas.microsoft.com/office/powerpoint/2010/main" Requires="p14">
+      <p:transition spd="slow" p14:dur="2000" advTm="0"/>
     </mc:Choice>
-    <mc:Fallback xmlns="">
-      <p:transition spd="med" advTm="10000">
-        <p:fade/>
-      </p:transition>
+    <mc:Fallback>
+      <p:transition spd="slow" advTm="0"/>
     </mc:Fallback>
   </mc:AlternateContent>
 </p:sld>

</xml_diff>